<commit_message>
added slides for 1021
</commit_message>
<xml_diff>
--- a/Slides/1014Recitation.pptx
+++ b/Slides/1014Recitation.pptx
@@ -7279,9 +7279,10 @@
           </a:p>
           <a:p>
             <a:r>
-              <a:rPr lang="en-US" dirty="0"/>
+              <a:rPr lang="en-US"/>
               <a:t>Michael Bartlett</a:t>
             </a:r>
+            <a:endParaRPr lang="en-US" dirty="0"/>
           </a:p>
         </p:txBody>
       </p:sp>
@@ -8610,9 +8611,10 @@
           <a:lstStyle/>
           <a:p>
             <a:r>
-              <a:rPr lang="en-US" dirty="0"/>
-              <a:t>Multidimensional Arrays</a:t>
-            </a:r>
+              <a:rPr lang="en-US" dirty="0" err="1"/>
+              <a:t>ArrayLists</a:t>
+            </a:r>
+            <a:endParaRPr lang="en-US" dirty="0"/>
           </a:p>
         </p:txBody>
       </p:sp>

</xml_diff>